<commit_message>
Updated slide with new git address
</commit_message>
<xml_diff>
--- a/Lab/DataVisualization/PythonLabPlots.pptx
+++ b/Lab/DataVisualization/PythonLabPlots.pptx
@@ -2978,6 +2978,30 @@
           <a:chExt cx="0" cy="0"/>
         </a:xfrm>
       </p:grpSpPr>
+      <p:pic>
+        <p:nvPicPr>
+          <p:cNvPr id="4" name="Picture 3"/>
+          <p:cNvPicPr>
+            <a:picLocks noChangeAspect="1"/>
+          </p:cNvPicPr>
+          <p:nvPr/>
+        </p:nvPicPr>
+        <p:blipFill>
+          <a:blip r:embed="rId2"/>
+          <a:stretch>
+            <a:fillRect/>
+          </a:stretch>
+        </p:blipFill>
+        <p:spPr>
+          <a:xfrm>
+            <a:off x="6196676" y="2315208"/>
+            <a:ext cx="5579792" cy="2898915"/>
+          </a:xfrm>
+          <a:prstGeom prst="rect">
+            <a:avLst/>
+          </a:prstGeom>
+        </p:spPr>
+      </p:pic>
       <p:sp>
         <p:nvSpPr>
           <p:cNvPr id="2" name="Title 1"/>
@@ -3013,13 +3037,13 @@
         </p:nvSpPr>
         <p:spPr>
           <a:xfrm>
-            <a:off x="602672" y="2031357"/>
-            <a:ext cx="6666229" cy="3466618"/>
+            <a:off x="602673" y="2031356"/>
+            <a:ext cx="5693956" cy="4207397"/>
           </a:xfrm>
         </p:spPr>
         <p:txBody>
           <a:bodyPr>
-            <a:normAutofit lnSpcReduction="10000"/>
+            <a:normAutofit/>
           </a:bodyPr>
           <a:lstStyle/>
           <a:p>
@@ -3041,7 +3065,7 @@
               <a:rPr lang="en-US" sz="2400" dirty="0">
                 <a:latin typeface="Times New Roman" panose="02020603050405020304" pitchFamily="18" charset="0"/>
                 <a:cs typeface="Times New Roman" panose="02020603050405020304" pitchFamily="18" charset="0"/>
-                <a:hlinkClick r:id="rId2"/>
+                <a:hlinkClick r:id="rId3"/>
               </a:rPr>
               <a:t>https://</a:t>
             </a:r>
@@ -3049,7 +3073,7 @@
               <a:rPr lang="en-US" sz="2400" dirty="0" smtClean="0">
                 <a:latin typeface="Times New Roman" panose="02020603050405020304" pitchFamily="18" charset="0"/>
                 <a:cs typeface="Times New Roman" panose="02020603050405020304" pitchFamily="18" charset="0"/>
-                <a:hlinkClick r:id="rId2"/>
+                <a:hlinkClick r:id="rId3"/>
               </a:rPr>
               <a:t>github.com/EmoryPython/Lab</a:t>
             </a:r>
@@ -3138,7 +3162,7 @@
               <a:rPr lang="en-US" sz="2400" dirty="0">
                 <a:latin typeface="Times New Roman" panose="02020603050405020304" pitchFamily="18" charset="0"/>
                 <a:cs typeface="Times New Roman" panose="02020603050405020304" pitchFamily="18" charset="0"/>
-                <a:hlinkClick r:id="rId3"/>
+                <a:hlinkClick r:id="rId4"/>
               </a:rPr>
               <a:t>https://github.com</a:t>
             </a:r>
@@ -3146,7 +3170,7 @@
               <a:rPr lang="en-US" sz="2400" dirty="0" smtClean="0">
                 <a:latin typeface="Times New Roman" panose="02020603050405020304" pitchFamily="18" charset="0"/>
                 <a:cs typeface="Times New Roman" panose="02020603050405020304" pitchFamily="18" charset="0"/>
-                <a:hlinkClick r:id="rId3"/>
+                <a:hlinkClick r:id="rId4"/>
               </a:rPr>
               <a:t>/</a:t>
             </a:r>
@@ -3163,29 +3187,6 @@
           </a:p>
         </p:txBody>
       </p:sp>
-      <p:pic>
-        <p:nvPicPr>
-          <p:cNvPr id="6" name="Picture 5"/>
-          <p:cNvPicPr>
-            <a:picLocks noChangeAspect="1"/>
-          </p:cNvPicPr>
-          <p:nvPr/>
-        </p:nvPicPr>
-        <p:blipFill rotWithShape="1">
-          <a:blip r:embed="rId4"/>
-          <a:srcRect l="56096"/>
-          <a:stretch/>
-        </p:blipFill>
-        <p:spPr>
-          <a:xfrm>
-            <a:off x="7221639" y="2031357"/>
-            <a:ext cx="4756230" cy="2979692"/>
-          </a:xfrm>
-          <a:prstGeom prst="rect">
-            <a:avLst/>
-          </a:prstGeom>
-        </p:spPr>
-      </p:pic>
     </p:spTree>
     <p:extLst>
       <p:ext uri="{BB962C8B-B14F-4D97-AF65-F5344CB8AC3E}">
@@ -4594,28 +4595,7 @@
                 <a:latin typeface="Times New Roman" panose="02020603050405020304" pitchFamily="18" charset="0"/>
                 <a:cs typeface="Times New Roman" panose="02020603050405020304" pitchFamily="18" charset="0"/>
               </a:rPr>
-              <a:t>Resample is a convenience method for resampling of a time series, and </a:t>
-            </a:r>
-            <a:r>
-              <a:rPr lang="en-US" sz="2400" dirty="0" smtClean="0">
-                <a:latin typeface="Times New Roman" panose="02020603050405020304" pitchFamily="18" charset="0"/>
-                <a:cs typeface="Times New Roman" panose="02020603050405020304" pitchFamily="18" charset="0"/>
-              </a:rPr>
-              <a:t>accepts an argument to </a:t>
-            </a:r>
-            <a:r>
-              <a:rPr lang="en-US" sz="2400" dirty="0" smtClean="0">
-                <a:latin typeface="Times New Roman" panose="02020603050405020304" pitchFamily="18" charset="0"/>
-                <a:cs typeface="Times New Roman" panose="02020603050405020304" pitchFamily="18" charset="0"/>
-              </a:rPr>
-              <a:t>indicate the periodicity – </a:t>
-            </a:r>
-            <a:r>
-              <a:rPr lang="en-US" sz="2400" dirty="0" smtClean="0">
-                <a:latin typeface="Times New Roman" panose="02020603050405020304" pitchFamily="18" charset="0"/>
-                <a:cs typeface="Times New Roman" panose="02020603050405020304" pitchFamily="18" charset="0"/>
-              </a:rPr>
-              <a:t>‘</a:t>
+              <a:t>Resample is a convenience method for resampling of a time series, and accepts an argument to indicate the periodicity – ‘</a:t>
             </a:r>
             <a:r>
               <a:rPr lang="en-US" sz="2400" b="1" dirty="0" smtClean="0">
@@ -4632,35 +4612,7 @@
                 <a:latin typeface="Times New Roman" panose="02020603050405020304" pitchFamily="18" charset="0"/>
                 <a:cs typeface="Times New Roman" panose="02020603050405020304" pitchFamily="18" charset="0"/>
               </a:rPr>
-              <a:t>’ </a:t>
-            </a:r>
-            <a:r>
-              <a:rPr lang="en-US" sz="2400" dirty="0" smtClean="0">
-                <a:latin typeface="Times New Roman" panose="02020603050405020304" pitchFamily="18" charset="0"/>
-                <a:cs typeface="Times New Roman" panose="02020603050405020304" pitchFamily="18" charset="0"/>
-              </a:rPr>
-              <a:t>being </a:t>
-            </a:r>
-            <a:r>
-              <a:rPr lang="en-US" sz="2400" dirty="0" smtClean="0">
-                <a:latin typeface="Times New Roman" panose="02020603050405020304" pitchFamily="18" charset="0"/>
-                <a:cs typeface="Times New Roman" panose="02020603050405020304" pitchFamily="18" charset="0"/>
-              </a:rPr>
-              <a:t>annual, which computes the sum </a:t>
-            </a:r>
-            <a:r>
-              <a:rPr lang="en-US" sz="2400" dirty="0" smtClean="0">
-                <a:latin typeface="Times New Roman" panose="02020603050405020304" pitchFamily="18" charset="0"/>
-                <a:cs typeface="Times New Roman" panose="02020603050405020304" pitchFamily="18" charset="0"/>
-              </a:rPr>
-              <a:t>of submissions per </a:t>
-            </a:r>
-            <a:r>
-              <a:rPr lang="en-US" sz="2400" dirty="0" smtClean="0">
-                <a:latin typeface="Times New Roman" panose="02020603050405020304" pitchFamily="18" charset="0"/>
-                <a:cs typeface="Times New Roman" panose="02020603050405020304" pitchFamily="18" charset="0"/>
-              </a:rPr>
-              <a:t>year. </a:t>
+              <a:t>’ being annual, which computes the sum of submissions per year. </a:t>
             </a:r>
             <a:endParaRPr lang="en-US" sz="2400" dirty="0">
               <a:latin typeface="Times New Roman" panose="02020603050405020304" pitchFamily="18" charset="0"/>

</xml_diff>